<commit_message>
no gui in lecture 5
</commit_message>
<xml_diff>
--- a/5. Loops/5. Loops.pptx
+++ b/5. Loops/5. Loops.pptx
@@ -12501,22 +12501,13 @@
             <a:pPr marL="723900" lvl="1" indent="-420688"/>
             <a:r>
               <a:rPr lang="bg-BG" dirty="0"/>
-              <a:t>Сумиране на гласни букви</a:t>
-            </a:r>
-          </a:p>
-          <a:p>
-            <a:pPr marL="514350" lvl="0" indent="-514350">
-              <a:buFont typeface="+mj-lt"/>
-              <a:buAutoNum type="arabicPeriod"/>
-            </a:pPr>
-            <a:r>
-              <a:rPr lang="bg-BG" dirty="0"/>
-              <a:t>Чертане на фигури с костенурка – графично приложение за </a:t>
-            </a:r>
-            <a:r>
-              <a:rPr lang="en-US" dirty="0"/>
-              <a:t>Windows</a:t>
-            </a:r>
+              <a:t>Сумиране на </a:t>
+            </a:r>
+            <a:r>
+              <a:rPr lang="bg-BG"/>
+              <a:t>гласни букви</a:t>
+            </a:r>
+            <a:endParaRPr lang="bg-BG" dirty="0"/>
           </a:p>
         </p:txBody>
       </p:sp>

</xml_diff>

<commit_message>
5-th lecture is fixed
</commit_message>
<xml_diff>
--- a/5. Loops/5. Loops.pptx
+++ b/5. Loops/5. Loops.pptx
@@ -136,7 +136,7 @@
   </p:defaultTextStyle>
   <p:extLst>
     <p:ext uri="{EFAFB233-063F-42B5-8137-9DF3F51BA10A}">
-      <p15:sldGuideLst xmlns:p15="http://schemas.microsoft.com/office/powerpoint/2012/main">
+      <p15:sldGuideLst xmlns:p15="http://schemas.microsoft.com/office/powerpoint/2012/main" xmlns="">
         <p15:guide id="1" orient="horz" pos="2160" userDrawn="1">
           <p15:clr>
             <a:srgbClr val="A4A3A4"/>
@@ -150,7 +150,7 @@
       </p15:sldGuideLst>
     </p:ext>
     <p:ext uri="{2D200454-40CA-4A62-9FC3-DE9A4176ACB9}">
-      <p15:notesGuideLst xmlns:p15="http://schemas.microsoft.com/office/powerpoint/2012/main">
+      <p15:notesGuideLst xmlns:p15="http://schemas.microsoft.com/office/powerpoint/2012/main" xmlns="">
         <p15:guide id="1" orient="horz" pos="2880">
           <p15:clr>
             <a:srgbClr val="A4A3A4"/>
@@ -250,7 +250,7 @@
             <a:fld id="{FE5B4EDC-59C0-49C7-8ADA-5A781B329E02}" type="datetimeFigureOut">
               <a:rPr lang="en-US"/>
               <a:pPr/>
-              <a:t>3/27/2017</a:t>
+              <a:t>5/17/2017</a:t>
             </a:fld>
             <a:endParaRPr dirty="0"/>
           </a:p>
@@ -449,7 +449,7 @@
             <a:fld id="{F2D8D46A-B586-417D-BFBD-8C8FE0AAF762}" type="datetimeFigureOut">
               <a:rPr lang="en-US" smtClean="0"/>
               <a:pPr/>
-              <a:t>3/27/2017</a:t>
+              <a:t>5/17/2017</a:t>
             </a:fld>
             <a:endParaRPr lang="en-US"/>
           </a:p>
@@ -2177,7 +2177,7 @@
             <a:fld id="{055373AC-9AA7-423B-BA00-BA1C74164DBD}" type="datetime1">
               <a:rPr lang="en-US" smtClean="0"/>
               <a:pPr/>
-              <a:t>3/27/2017</a:t>
+              <a:t>5/17/2017</a:t>
             </a:fld>
             <a:endParaRPr lang="en-US" dirty="0"/>
           </a:p>
@@ -3345,7 +3345,7 @@
             <a:fld id="{055373AC-9AA7-423B-BA00-BA1C74164DBD}" type="datetime1">
               <a:rPr lang="en-US" smtClean="0"/>
               <a:pPr/>
-              <a:t>3/27/2017</a:t>
+              <a:t>5/17/2017</a:t>
             </a:fld>
             <a:endParaRPr lang="en-US" dirty="0"/>
           </a:p>
@@ -3874,7 +3874,7 @@
   </p:txStyles>
   <p:extLst mod="1">
     <p:ext uri="{27BBF7A9-308A-43DC-89C8-2F10F3537804}">
-      <p15:sldGuideLst xmlns:p15="http://schemas.microsoft.com/office/powerpoint/2012/main">
+      <p15:sldGuideLst xmlns:p15="http://schemas.microsoft.com/office/powerpoint/2012/main" xmlns="">
         <p15:guide id="1" orient="horz" pos="2160" userDrawn="1">
           <p15:clr>
             <a:srgbClr val="F26B43"/>
@@ -5756,13 +5756,23 @@
               <a:rPr lang="en-US" dirty="0">
                 <a:hlinkClick r:id="rId2"/>
               </a:rPr>
-              <a:t>https://judge.softuni.bg/Contests/Practice/Index/154#</a:t>
-            </a:r>
-            <a:r>
-              <a:rPr lang="bg-BG" dirty="0">
+              <a:t>https://</a:t>
+            </a:r>
+            <a:r>
+              <a:rPr lang="en-US" dirty="0" smtClean="0">
                 <a:hlinkClick r:id="rId2"/>
               </a:rPr>
+              <a:t>judge.softuni.bg/Contests/Practice/Index/532#</a:t>
+            </a:r>
+            <a:r>
+              <a:rPr lang="bg-BG" dirty="0" smtClean="0">
+                <a:hlinkClick r:id="rId2"/>
+              </a:rPr>
               <a:t>4</a:t>
+            </a:r>
+            <a:r>
+              <a:rPr lang="en-US" dirty="0" smtClean="0"/>
+              <a:t> </a:t>
             </a:r>
             <a:endParaRPr lang="en-US" dirty="0"/>
           </a:p>
@@ -6886,13 +6896,23 @@
               <a:rPr lang="en-US" dirty="0">
                 <a:hlinkClick r:id="rId2"/>
               </a:rPr>
-              <a:t>https://judge.softuni.bg/Contests/Practice/Index/154#</a:t>
-            </a:r>
-            <a:r>
-              <a:rPr lang="bg-BG" dirty="0">
+              <a:t>https://</a:t>
+            </a:r>
+            <a:r>
+              <a:rPr lang="en-US" dirty="0" smtClean="0">
                 <a:hlinkClick r:id="rId2"/>
               </a:rPr>
+              <a:t>judge.softuni.bg/Contests/Practice/Index/532#</a:t>
+            </a:r>
+            <a:r>
+              <a:rPr lang="bg-BG" dirty="0" smtClean="0">
+                <a:hlinkClick r:id="rId2"/>
+              </a:rPr>
               <a:t>5</a:t>
+            </a:r>
+            <a:r>
+              <a:rPr lang="en-US" dirty="0"/>
+              <a:t> </a:t>
             </a:r>
             <a:endParaRPr lang="en-US" dirty="0"/>
           </a:p>
@@ -8782,7 +8802,17 @@
               <a:rPr lang="en-US" dirty="0">
                 <a:hlinkClick r:id="rId2"/>
               </a:rPr>
-              <a:t>https://judge.softuni.bg/Contests/Practice/Index/154#6</a:t>
+              <a:t>https://</a:t>
+            </a:r>
+            <a:r>
+              <a:rPr lang="en-US" dirty="0" smtClean="0">
+                <a:hlinkClick r:id="rId2"/>
+              </a:rPr>
+              <a:t>judge.softuni.bg/Contests/Practice/Index/532#3</a:t>
+            </a:r>
+            <a:r>
+              <a:rPr lang="en-US" dirty="0" smtClean="0"/>
+              <a:t> </a:t>
             </a:r>
             <a:endParaRPr lang="en-US" dirty="0"/>
           </a:p>
@@ -10658,7 +10688,17 @@
               <a:rPr lang="en-US" dirty="0">
                 <a:hlinkClick r:id="rId2"/>
               </a:rPr>
-              <a:t>https://judge.softuni.bg/Contests/Practice/Index/154#7</a:t>
+              <a:t>https://</a:t>
+            </a:r>
+            <a:r>
+              <a:rPr lang="en-US" dirty="0" smtClean="0">
+                <a:hlinkClick r:id="rId2"/>
+              </a:rPr>
+              <a:t>judge.softuni.bg/Contests/Practice/Index/532#10</a:t>
+            </a:r>
+            <a:r>
+              <a:rPr lang="en-US" dirty="0" smtClean="0"/>
+              <a:t> </a:t>
             </a:r>
             <a:endParaRPr lang="en-US" dirty="0"/>
           </a:p>
@@ -11040,35 +11080,35 @@
                 <a:gridCol w="1038920">
                   <a:extLst>
                     <a:ext uri="{9D8B030D-6E8A-4147-A177-3AD203B41FA5}">
-                      <a16:colId xmlns:a16="http://schemas.microsoft.com/office/drawing/2014/main" val="20000"/>
+                      <a16:colId xmlns:a16="http://schemas.microsoft.com/office/drawing/2014/main" xmlns="" val="20000"/>
                     </a:ext>
                   </a:extLst>
                 </a:gridCol>
                 <a:gridCol w="1038920">
                   <a:extLst>
                     <a:ext uri="{9D8B030D-6E8A-4147-A177-3AD203B41FA5}">
-                      <a16:colId xmlns:a16="http://schemas.microsoft.com/office/drawing/2014/main" val="20001"/>
+                      <a16:colId xmlns:a16="http://schemas.microsoft.com/office/drawing/2014/main" xmlns="" val="20001"/>
                     </a:ext>
                   </a:extLst>
                 </a:gridCol>
                 <a:gridCol w="1038920">
                   <a:extLst>
                     <a:ext uri="{9D8B030D-6E8A-4147-A177-3AD203B41FA5}">
-                      <a16:colId xmlns:a16="http://schemas.microsoft.com/office/drawing/2014/main" val="20002"/>
+                      <a16:colId xmlns:a16="http://schemas.microsoft.com/office/drawing/2014/main" xmlns="" val="20002"/>
                     </a:ext>
                   </a:extLst>
                 </a:gridCol>
                 <a:gridCol w="1038920">
                   <a:extLst>
                     <a:ext uri="{9D8B030D-6E8A-4147-A177-3AD203B41FA5}">
-                      <a16:colId xmlns:a16="http://schemas.microsoft.com/office/drawing/2014/main" val="20003"/>
+                      <a16:colId xmlns:a16="http://schemas.microsoft.com/office/drawing/2014/main" xmlns="" val="20003"/>
                     </a:ext>
                   </a:extLst>
                 </a:gridCol>
                 <a:gridCol w="1038920">
                   <a:extLst>
                     <a:ext uri="{9D8B030D-6E8A-4147-A177-3AD203B41FA5}">
-                      <a16:colId xmlns:a16="http://schemas.microsoft.com/office/drawing/2014/main" val="20004"/>
+                      <a16:colId xmlns:a16="http://schemas.microsoft.com/office/drawing/2014/main" xmlns="" val="20004"/>
                     </a:ext>
                   </a:extLst>
                 </a:gridCol>
@@ -11299,7 +11339,7 @@
                 </a:tc>
                 <a:extLst>
                   <a:ext uri="{0D108BD9-81ED-4DB2-BD59-A6C34878D82A}">
-                    <a16:rowId xmlns:a16="http://schemas.microsoft.com/office/drawing/2014/main" val="10000"/>
+                    <a16:rowId xmlns:a16="http://schemas.microsoft.com/office/drawing/2014/main" xmlns="" val="10000"/>
                   </a:ext>
                 </a:extLst>
               </a:tr>
@@ -11454,7 +11494,7 @@
                 </a:tc>
                 <a:extLst>
                   <a:ext uri="{0D108BD9-81ED-4DB2-BD59-A6C34878D82A}">
-                    <a16:rowId xmlns:a16="http://schemas.microsoft.com/office/drawing/2014/main" val="10001"/>
+                    <a16:rowId xmlns:a16="http://schemas.microsoft.com/office/drawing/2014/main" xmlns="" val="10001"/>
                   </a:ext>
                 </a:extLst>
               </a:tr>
@@ -12988,12 +13028,19 @@
               <a:rPr lang="en-US" dirty="0">
                 <a:hlinkClick r:id="rId2"/>
               </a:rPr>
-              <a:t>https://judge.softuni.bg/Contests/Practice/Index/154#8</a:t>
-            </a:r>
-            <a:r>
-              <a:rPr lang="en-US" dirty="0"/>
+              <a:t>https://</a:t>
+            </a:r>
+            <a:r>
+              <a:rPr lang="en-US" dirty="0" smtClean="0">
+                <a:hlinkClick r:id="rId2"/>
+              </a:rPr>
+              <a:t>judge.softuni.bg/Contests/Practice/Index/532#6</a:t>
+            </a:r>
+            <a:r>
+              <a:rPr lang="en-US" dirty="0" smtClean="0"/>
               <a:t> </a:t>
             </a:r>
+            <a:endParaRPr lang="en-US" dirty="0"/>
           </a:p>
         </p:txBody>
       </p:sp>
@@ -16936,7 +16983,17 @@
               <a:rPr lang="en-US" dirty="0">
                 <a:hlinkClick r:id="rId2"/>
               </a:rPr>
-              <a:t>https://judge.softuni.bg/Contests/Practice/Index/154#0</a:t>
+              <a:t>https://</a:t>
+            </a:r>
+            <a:r>
+              <a:rPr lang="en-US" dirty="0" smtClean="0">
+                <a:hlinkClick r:id="rId2"/>
+              </a:rPr>
+              <a:t>judge.softuni.bg/Contests/Practice/Index/532#9</a:t>
+            </a:r>
+            <a:r>
+              <a:rPr lang="en-US" dirty="0" smtClean="0"/>
+              <a:t> </a:t>
             </a:r>
             <a:endParaRPr lang="en-US" dirty="0"/>
           </a:p>
@@ -17347,7 +17404,17 @@
               <a:rPr lang="en-US" dirty="0">
                 <a:hlinkClick r:id="rId2"/>
               </a:rPr>
-              <a:t>https://judge.softuni.bg/Contests/Practice/Index/154#1</a:t>
+              <a:t>https://</a:t>
+            </a:r>
+            <a:r>
+              <a:rPr lang="en-US" dirty="0" smtClean="0">
+                <a:hlinkClick r:id="rId2"/>
+              </a:rPr>
+              <a:t>judge.softuni.bg/Contests/Practice/Index/532#8</a:t>
+            </a:r>
+            <a:r>
+              <a:rPr lang="en-US" dirty="0" smtClean="0"/>
+              <a:t> </a:t>
             </a:r>
             <a:endParaRPr lang="en-US" dirty="0"/>
           </a:p>
@@ -17800,7 +17867,17 @@
               <a:rPr lang="en-US" dirty="0">
                 <a:hlinkClick r:id="rId2"/>
               </a:rPr>
-              <a:t>https://judge.softuni.bg/Contests/Practice/Index/154#2</a:t>
+              <a:t>https://</a:t>
+            </a:r>
+            <a:r>
+              <a:rPr lang="en-US" dirty="0" smtClean="0">
+                <a:hlinkClick r:id="rId2"/>
+              </a:rPr>
+              <a:t>judge.softuni.bg/Contests/Practice/Index/532#0</a:t>
+            </a:r>
+            <a:r>
+              <a:rPr lang="en-US" dirty="0" smtClean="0"/>
+              <a:t> </a:t>
             </a:r>
             <a:endParaRPr lang="en-US" dirty="0"/>
           </a:p>
@@ -19281,7 +19358,17 @@
               <a:rPr lang="en-US" dirty="0">
                 <a:hlinkClick r:id="rId2"/>
               </a:rPr>
-              <a:t>https://judge.softuni.bg/Contests/Practice/Index/154#3</a:t>
+              <a:t>https://</a:t>
+            </a:r>
+            <a:r>
+              <a:rPr lang="en-US" dirty="0" smtClean="0">
+                <a:hlinkClick r:id="rId2"/>
+              </a:rPr>
+              <a:t>judge.softuni.bg/Contests/Practice/Index/532#7</a:t>
+            </a:r>
+            <a:r>
+              <a:rPr lang="en-US" dirty="0" smtClean="0"/>
+              <a:t> </a:t>
             </a:r>
             <a:endParaRPr lang="en-US" dirty="0"/>
           </a:p>

</xml_diff>